<commit_message>
Finalizacao da Api e da Apresentacao
</commit_message>
<xml_diff>
--- a/documentações/Apresentação1.pptx
+++ b/documentações/Apresentação1.pptx
@@ -8,6 +8,8 @@
     <p:sldId id="256" r:id="rId2"/>
     <p:sldId id="257" r:id="rId3"/>
     <p:sldId id="258" r:id="rId4"/>
+    <p:sldId id="259" r:id="rId5"/>
+    <p:sldId id="260" r:id="rId6"/>
   </p:sldIdLst>
   <p:sldSz cx="12192000" cy="6858000"/>
   <p:notesSz cx="6858000" cy="9144000"/>
@@ -131,7 +133,7 @@
           <p:cNvPr id="2" name="Título 1">
             <a:extLst>
               <a:ext uri="{FF2B5EF4-FFF2-40B4-BE49-F238E27FC236}">
-                <a16:creationId xmlns:a16="http://schemas.microsoft.com/office/drawing/2014/main" id="{B8321AA9-140E-4634-9D9E-B97F7A825E23}"/>
+                <a16:creationId xmlns:a16="http://schemas.microsoft.com/office/drawing/2014/main" id="{CDBFB2FA-26BA-4744-85E5-A796C826C929}"/>
               </a:ext>
             </a:extLst>
           </p:cNvPr>
@@ -168,7 +170,7 @@
           <p:cNvPr id="3" name="Subtítulo 2">
             <a:extLst>
               <a:ext uri="{FF2B5EF4-FFF2-40B4-BE49-F238E27FC236}">
-                <a16:creationId xmlns:a16="http://schemas.microsoft.com/office/drawing/2014/main" id="{8E093CC8-205A-4FB2-8341-D393F5FCD8FA}"/>
+                <a16:creationId xmlns:a16="http://schemas.microsoft.com/office/drawing/2014/main" id="{D1377AFD-5821-4729-9B74-C92855704BFE}"/>
               </a:ext>
             </a:extLst>
           </p:cNvPr>
@@ -238,7 +240,7 @@
           <p:cNvPr id="4" name="Espaço Reservado para Data 3">
             <a:extLst>
               <a:ext uri="{FF2B5EF4-FFF2-40B4-BE49-F238E27FC236}">
-                <a16:creationId xmlns:a16="http://schemas.microsoft.com/office/drawing/2014/main" id="{87AF961E-2D30-48DA-B375-89EE8211A245}"/>
+                <a16:creationId xmlns:a16="http://schemas.microsoft.com/office/drawing/2014/main" id="{85275AB1-AC0A-4F4F-B805-EEE85D446406}"/>
               </a:ext>
             </a:extLst>
           </p:cNvPr>
@@ -254,9 +256,9 @@
           <a:bodyPr/>
           <a:lstStyle/>
           <a:p>
-            <a:fld id="{2C9188EB-1D0E-4B79-B58B-E64712D811BA}" type="datetimeFigureOut">
+            <a:fld id="{D5492F46-3C2A-433E-96A0-25601C8A9332}" type="datetimeFigureOut">
               <a:rPr lang="pt-BR" smtClean="0"/>
-              <a:t>30/05/2021</a:t>
+              <a:t>01/06/2021</a:t>
             </a:fld>
             <a:endParaRPr lang="pt-BR"/>
           </a:p>
@@ -267,7 +269,7 @@
           <p:cNvPr id="5" name="Espaço Reservado para Rodapé 4">
             <a:extLst>
               <a:ext uri="{FF2B5EF4-FFF2-40B4-BE49-F238E27FC236}">
-                <a16:creationId xmlns:a16="http://schemas.microsoft.com/office/drawing/2014/main" id="{DF7A010A-0AEB-4E27-B624-5063D98AFA7E}"/>
+                <a16:creationId xmlns:a16="http://schemas.microsoft.com/office/drawing/2014/main" id="{CB957416-252C-47DB-8D29-6C201395738C}"/>
               </a:ext>
             </a:extLst>
           </p:cNvPr>
@@ -292,7 +294,7 @@
           <p:cNvPr id="6" name="Espaço Reservado para Número de Slide 5">
             <a:extLst>
               <a:ext uri="{FF2B5EF4-FFF2-40B4-BE49-F238E27FC236}">
-                <a16:creationId xmlns:a16="http://schemas.microsoft.com/office/drawing/2014/main" id="{ED51C503-15AC-4222-8D0E-1547AE99F923}"/>
+                <a16:creationId xmlns:a16="http://schemas.microsoft.com/office/drawing/2014/main" id="{0FFE7A98-915E-4831-B347-1671012D544C}"/>
               </a:ext>
             </a:extLst>
           </p:cNvPr>
@@ -308,7 +310,7 @@
           <a:bodyPr/>
           <a:lstStyle/>
           <a:p>
-            <a:fld id="{9EDD5F49-AB6D-44D5-B832-F428163E8AB2}" type="slidenum">
+            <a:fld id="{A55E18BB-735D-482A-ABC0-87C3B8A5657F}" type="slidenum">
               <a:rPr lang="pt-BR" smtClean="0"/>
               <a:t>‹nº›</a:t>
             </a:fld>
@@ -319,7 +321,7 @@
     </p:spTree>
     <p:extLst>
       <p:ext uri="{BB962C8B-B14F-4D97-AF65-F5344CB8AC3E}">
-        <p14:creationId xmlns:p14="http://schemas.microsoft.com/office/powerpoint/2010/main" val="1152677606"/>
+        <p14:creationId xmlns:p14="http://schemas.microsoft.com/office/powerpoint/2010/main" val="3768687233"/>
       </p:ext>
     </p:extLst>
   </p:cSld>
@@ -351,7 +353,7 @@
           <p:cNvPr id="2" name="Título 1">
             <a:extLst>
               <a:ext uri="{FF2B5EF4-FFF2-40B4-BE49-F238E27FC236}">
-                <a16:creationId xmlns:a16="http://schemas.microsoft.com/office/drawing/2014/main" id="{46C7CB5E-4AB7-4733-9188-E7E5FFED4104}"/>
+                <a16:creationId xmlns:a16="http://schemas.microsoft.com/office/drawing/2014/main" id="{87190EF8-8E35-4F24-BAD7-E1738E6637E6}"/>
               </a:ext>
             </a:extLst>
           </p:cNvPr>
@@ -379,7 +381,7 @@
           <p:cNvPr id="3" name="Espaço Reservado para Texto Vertical 2">
             <a:extLst>
               <a:ext uri="{FF2B5EF4-FFF2-40B4-BE49-F238E27FC236}">
-                <a16:creationId xmlns:a16="http://schemas.microsoft.com/office/drawing/2014/main" id="{45866EDD-057F-4CB9-A9AD-1CFD728C0402}"/>
+                <a16:creationId xmlns:a16="http://schemas.microsoft.com/office/drawing/2014/main" id="{46CF2DF8-D393-4F14-BD07-4775F8C301B0}"/>
               </a:ext>
             </a:extLst>
           </p:cNvPr>
@@ -436,7 +438,7 @@
           <p:cNvPr id="4" name="Espaço Reservado para Data 3">
             <a:extLst>
               <a:ext uri="{FF2B5EF4-FFF2-40B4-BE49-F238E27FC236}">
-                <a16:creationId xmlns:a16="http://schemas.microsoft.com/office/drawing/2014/main" id="{A4BFFAB8-A8E9-4AA3-9E11-759C8A0024E3}"/>
+                <a16:creationId xmlns:a16="http://schemas.microsoft.com/office/drawing/2014/main" id="{0E432FE3-2DBE-4978-A01C-846012162C32}"/>
               </a:ext>
             </a:extLst>
           </p:cNvPr>
@@ -452,9 +454,9 @@
           <a:bodyPr/>
           <a:lstStyle/>
           <a:p>
-            <a:fld id="{2C9188EB-1D0E-4B79-B58B-E64712D811BA}" type="datetimeFigureOut">
+            <a:fld id="{D5492F46-3C2A-433E-96A0-25601C8A9332}" type="datetimeFigureOut">
               <a:rPr lang="pt-BR" smtClean="0"/>
-              <a:t>30/05/2021</a:t>
+              <a:t>01/06/2021</a:t>
             </a:fld>
             <a:endParaRPr lang="pt-BR"/>
           </a:p>
@@ -465,7 +467,7 @@
           <p:cNvPr id="5" name="Espaço Reservado para Rodapé 4">
             <a:extLst>
               <a:ext uri="{FF2B5EF4-FFF2-40B4-BE49-F238E27FC236}">
-                <a16:creationId xmlns:a16="http://schemas.microsoft.com/office/drawing/2014/main" id="{A2803911-F58E-4602-8F49-E9351C4589ED}"/>
+                <a16:creationId xmlns:a16="http://schemas.microsoft.com/office/drawing/2014/main" id="{24D22B26-C94A-4CA6-B26B-2D1B4FF568A5}"/>
               </a:ext>
             </a:extLst>
           </p:cNvPr>
@@ -490,7 +492,7 @@
           <p:cNvPr id="6" name="Espaço Reservado para Número de Slide 5">
             <a:extLst>
               <a:ext uri="{FF2B5EF4-FFF2-40B4-BE49-F238E27FC236}">
-                <a16:creationId xmlns:a16="http://schemas.microsoft.com/office/drawing/2014/main" id="{847A2965-30B4-4EFC-9422-75752A18E883}"/>
+                <a16:creationId xmlns:a16="http://schemas.microsoft.com/office/drawing/2014/main" id="{3E89C16F-045D-4A5E-9241-D2AE4B83A394}"/>
               </a:ext>
             </a:extLst>
           </p:cNvPr>
@@ -506,7 +508,7 @@
           <a:bodyPr/>
           <a:lstStyle/>
           <a:p>
-            <a:fld id="{9EDD5F49-AB6D-44D5-B832-F428163E8AB2}" type="slidenum">
+            <a:fld id="{A55E18BB-735D-482A-ABC0-87C3B8A5657F}" type="slidenum">
               <a:rPr lang="pt-BR" smtClean="0"/>
               <a:t>‹nº›</a:t>
             </a:fld>
@@ -517,7 +519,7 @@
     </p:spTree>
     <p:extLst>
       <p:ext uri="{BB962C8B-B14F-4D97-AF65-F5344CB8AC3E}">
-        <p14:creationId xmlns:p14="http://schemas.microsoft.com/office/powerpoint/2010/main" val="1737954236"/>
+        <p14:creationId xmlns:p14="http://schemas.microsoft.com/office/powerpoint/2010/main" val="565775320"/>
       </p:ext>
     </p:extLst>
   </p:cSld>
@@ -549,7 +551,7 @@
           <p:cNvPr id="2" name="Título Vertical 1">
             <a:extLst>
               <a:ext uri="{FF2B5EF4-FFF2-40B4-BE49-F238E27FC236}">
-                <a16:creationId xmlns:a16="http://schemas.microsoft.com/office/drawing/2014/main" id="{5A57A147-C2FD-49B3-AA49-70AF559198E5}"/>
+                <a16:creationId xmlns:a16="http://schemas.microsoft.com/office/drawing/2014/main" id="{99662F3F-9975-49DD-8FD2-9ABE178F1590}"/>
               </a:ext>
             </a:extLst>
           </p:cNvPr>
@@ -582,7 +584,7 @@
           <p:cNvPr id="3" name="Espaço Reservado para Texto Vertical 2">
             <a:extLst>
               <a:ext uri="{FF2B5EF4-FFF2-40B4-BE49-F238E27FC236}">
-                <a16:creationId xmlns:a16="http://schemas.microsoft.com/office/drawing/2014/main" id="{7AE6DAEC-CE5D-4005-9C17-FB432E211812}"/>
+                <a16:creationId xmlns:a16="http://schemas.microsoft.com/office/drawing/2014/main" id="{98638095-318A-4316-8C1D-2C2E51E6BC7C}"/>
               </a:ext>
             </a:extLst>
           </p:cNvPr>
@@ -644,7 +646,7 @@
           <p:cNvPr id="4" name="Espaço Reservado para Data 3">
             <a:extLst>
               <a:ext uri="{FF2B5EF4-FFF2-40B4-BE49-F238E27FC236}">
-                <a16:creationId xmlns:a16="http://schemas.microsoft.com/office/drawing/2014/main" id="{60F0EE2B-A102-4DCA-8F2E-FE7DC6A11760}"/>
+                <a16:creationId xmlns:a16="http://schemas.microsoft.com/office/drawing/2014/main" id="{A5ECBC31-6C88-49AC-A0B6-133CD6639818}"/>
               </a:ext>
             </a:extLst>
           </p:cNvPr>
@@ -660,9 +662,9 @@
           <a:bodyPr/>
           <a:lstStyle/>
           <a:p>
-            <a:fld id="{2C9188EB-1D0E-4B79-B58B-E64712D811BA}" type="datetimeFigureOut">
+            <a:fld id="{D5492F46-3C2A-433E-96A0-25601C8A9332}" type="datetimeFigureOut">
               <a:rPr lang="pt-BR" smtClean="0"/>
-              <a:t>30/05/2021</a:t>
+              <a:t>01/06/2021</a:t>
             </a:fld>
             <a:endParaRPr lang="pt-BR"/>
           </a:p>
@@ -673,7 +675,7 @@
           <p:cNvPr id="5" name="Espaço Reservado para Rodapé 4">
             <a:extLst>
               <a:ext uri="{FF2B5EF4-FFF2-40B4-BE49-F238E27FC236}">
-                <a16:creationId xmlns:a16="http://schemas.microsoft.com/office/drawing/2014/main" id="{B4368259-90E9-4A1E-BF06-4AC4C23CB103}"/>
+                <a16:creationId xmlns:a16="http://schemas.microsoft.com/office/drawing/2014/main" id="{E9D88036-0309-40C5-BB80-D948B211AD3C}"/>
               </a:ext>
             </a:extLst>
           </p:cNvPr>
@@ -698,7 +700,7 @@
           <p:cNvPr id="6" name="Espaço Reservado para Número de Slide 5">
             <a:extLst>
               <a:ext uri="{FF2B5EF4-FFF2-40B4-BE49-F238E27FC236}">
-                <a16:creationId xmlns:a16="http://schemas.microsoft.com/office/drawing/2014/main" id="{E8E7848B-7DB2-4E38-9DB9-0FBAF33B7196}"/>
+                <a16:creationId xmlns:a16="http://schemas.microsoft.com/office/drawing/2014/main" id="{2A4B9ABE-949C-47DB-B9A8-DB173DB06674}"/>
               </a:ext>
             </a:extLst>
           </p:cNvPr>
@@ -714,7 +716,7 @@
           <a:bodyPr/>
           <a:lstStyle/>
           <a:p>
-            <a:fld id="{9EDD5F49-AB6D-44D5-B832-F428163E8AB2}" type="slidenum">
+            <a:fld id="{A55E18BB-735D-482A-ABC0-87C3B8A5657F}" type="slidenum">
               <a:rPr lang="pt-BR" smtClean="0"/>
               <a:t>‹nº›</a:t>
             </a:fld>
@@ -725,7 +727,7 @@
     </p:spTree>
     <p:extLst>
       <p:ext uri="{BB962C8B-B14F-4D97-AF65-F5344CB8AC3E}">
-        <p14:creationId xmlns:p14="http://schemas.microsoft.com/office/powerpoint/2010/main" val="2356507908"/>
+        <p14:creationId xmlns:p14="http://schemas.microsoft.com/office/powerpoint/2010/main" val="4157322238"/>
       </p:ext>
     </p:extLst>
   </p:cSld>
@@ -757,7 +759,7 @@
           <p:cNvPr id="2" name="Título 1">
             <a:extLst>
               <a:ext uri="{FF2B5EF4-FFF2-40B4-BE49-F238E27FC236}">
-                <a16:creationId xmlns:a16="http://schemas.microsoft.com/office/drawing/2014/main" id="{769FB020-DD50-44F4-A8D6-E5106231219F}"/>
+                <a16:creationId xmlns:a16="http://schemas.microsoft.com/office/drawing/2014/main" id="{4D258749-A7E5-4A59-8321-1AA06CBB7F2D}"/>
               </a:ext>
             </a:extLst>
           </p:cNvPr>
@@ -785,7 +787,7 @@
           <p:cNvPr id="3" name="Espaço Reservado para Conteúdo 2">
             <a:extLst>
               <a:ext uri="{FF2B5EF4-FFF2-40B4-BE49-F238E27FC236}">
-                <a16:creationId xmlns:a16="http://schemas.microsoft.com/office/drawing/2014/main" id="{4DCBF941-1F57-4CDA-8561-CB0934AB2CE1}"/>
+                <a16:creationId xmlns:a16="http://schemas.microsoft.com/office/drawing/2014/main" id="{AFB69B89-988F-44A9-82C3-8C2A9C5B0C2F}"/>
               </a:ext>
             </a:extLst>
           </p:cNvPr>
@@ -842,7 +844,7 @@
           <p:cNvPr id="4" name="Espaço Reservado para Data 3">
             <a:extLst>
               <a:ext uri="{FF2B5EF4-FFF2-40B4-BE49-F238E27FC236}">
-                <a16:creationId xmlns:a16="http://schemas.microsoft.com/office/drawing/2014/main" id="{80A53E6A-2E5A-4E62-BFE4-BF6A6AE96ED8}"/>
+                <a16:creationId xmlns:a16="http://schemas.microsoft.com/office/drawing/2014/main" id="{E19709BC-CE2B-41BA-8B10-85CE49098B52}"/>
               </a:ext>
             </a:extLst>
           </p:cNvPr>
@@ -858,9 +860,9 @@
           <a:bodyPr/>
           <a:lstStyle/>
           <a:p>
-            <a:fld id="{2C9188EB-1D0E-4B79-B58B-E64712D811BA}" type="datetimeFigureOut">
+            <a:fld id="{D5492F46-3C2A-433E-96A0-25601C8A9332}" type="datetimeFigureOut">
               <a:rPr lang="pt-BR" smtClean="0"/>
-              <a:t>30/05/2021</a:t>
+              <a:t>01/06/2021</a:t>
             </a:fld>
             <a:endParaRPr lang="pt-BR"/>
           </a:p>
@@ -871,7 +873,7 @@
           <p:cNvPr id="5" name="Espaço Reservado para Rodapé 4">
             <a:extLst>
               <a:ext uri="{FF2B5EF4-FFF2-40B4-BE49-F238E27FC236}">
-                <a16:creationId xmlns:a16="http://schemas.microsoft.com/office/drawing/2014/main" id="{7896003A-867C-4497-9703-14D82081AA1A}"/>
+                <a16:creationId xmlns:a16="http://schemas.microsoft.com/office/drawing/2014/main" id="{7F415353-A237-493C-8362-FBF11763E0D7}"/>
               </a:ext>
             </a:extLst>
           </p:cNvPr>
@@ -896,7 +898,7 @@
           <p:cNvPr id="6" name="Espaço Reservado para Número de Slide 5">
             <a:extLst>
               <a:ext uri="{FF2B5EF4-FFF2-40B4-BE49-F238E27FC236}">
-                <a16:creationId xmlns:a16="http://schemas.microsoft.com/office/drawing/2014/main" id="{CE12DFE0-9FF6-498F-82E7-8E52F99F6D3B}"/>
+                <a16:creationId xmlns:a16="http://schemas.microsoft.com/office/drawing/2014/main" id="{DD1FA8AE-A41D-4C02-B2FB-E1296AB42014}"/>
               </a:ext>
             </a:extLst>
           </p:cNvPr>
@@ -912,7 +914,7 @@
           <a:bodyPr/>
           <a:lstStyle/>
           <a:p>
-            <a:fld id="{9EDD5F49-AB6D-44D5-B832-F428163E8AB2}" type="slidenum">
+            <a:fld id="{A55E18BB-735D-482A-ABC0-87C3B8A5657F}" type="slidenum">
               <a:rPr lang="pt-BR" smtClean="0"/>
               <a:t>‹nº›</a:t>
             </a:fld>
@@ -923,7 +925,7 @@
     </p:spTree>
     <p:extLst>
       <p:ext uri="{BB962C8B-B14F-4D97-AF65-F5344CB8AC3E}">
-        <p14:creationId xmlns:p14="http://schemas.microsoft.com/office/powerpoint/2010/main" val="1285718357"/>
+        <p14:creationId xmlns:p14="http://schemas.microsoft.com/office/powerpoint/2010/main" val="4110375216"/>
       </p:ext>
     </p:extLst>
   </p:cSld>
@@ -955,7 +957,7 @@
           <p:cNvPr id="2" name="Título 1">
             <a:extLst>
               <a:ext uri="{FF2B5EF4-FFF2-40B4-BE49-F238E27FC236}">
-                <a16:creationId xmlns:a16="http://schemas.microsoft.com/office/drawing/2014/main" id="{92F5F6CC-D144-4C54-912F-BD5CEA2423E6}"/>
+                <a16:creationId xmlns:a16="http://schemas.microsoft.com/office/drawing/2014/main" id="{797EC6EF-E4EF-4848-A929-A4D9476160AE}"/>
               </a:ext>
             </a:extLst>
           </p:cNvPr>
@@ -992,7 +994,7 @@
           <p:cNvPr id="3" name="Espaço Reservado para Texto 2">
             <a:extLst>
               <a:ext uri="{FF2B5EF4-FFF2-40B4-BE49-F238E27FC236}">
-                <a16:creationId xmlns:a16="http://schemas.microsoft.com/office/drawing/2014/main" id="{1657B4F2-64FB-4CB7-AD44-483485E3C675}"/>
+                <a16:creationId xmlns:a16="http://schemas.microsoft.com/office/drawing/2014/main" id="{D491D61F-F786-49F5-9A1F-5A5CFFDDECEF}"/>
               </a:ext>
             </a:extLst>
           </p:cNvPr>
@@ -1117,7 +1119,7 @@
           <p:cNvPr id="4" name="Espaço Reservado para Data 3">
             <a:extLst>
               <a:ext uri="{FF2B5EF4-FFF2-40B4-BE49-F238E27FC236}">
-                <a16:creationId xmlns:a16="http://schemas.microsoft.com/office/drawing/2014/main" id="{C0AFFA7E-D570-4534-9D94-4F3A09B28215}"/>
+                <a16:creationId xmlns:a16="http://schemas.microsoft.com/office/drawing/2014/main" id="{A724F404-829F-42BE-94BB-A0231DF87D4B}"/>
               </a:ext>
             </a:extLst>
           </p:cNvPr>
@@ -1133,9 +1135,9 @@
           <a:bodyPr/>
           <a:lstStyle/>
           <a:p>
-            <a:fld id="{2C9188EB-1D0E-4B79-B58B-E64712D811BA}" type="datetimeFigureOut">
+            <a:fld id="{D5492F46-3C2A-433E-96A0-25601C8A9332}" type="datetimeFigureOut">
               <a:rPr lang="pt-BR" smtClean="0"/>
-              <a:t>30/05/2021</a:t>
+              <a:t>01/06/2021</a:t>
             </a:fld>
             <a:endParaRPr lang="pt-BR"/>
           </a:p>
@@ -1146,7 +1148,7 @@
           <p:cNvPr id="5" name="Espaço Reservado para Rodapé 4">
             <a:extLst>
               <a:ext uri="{FF2B5EF4-FFF2-40B4-BE49-F238E27FC236}">
-                <a16:creationId xmlns:a16="http://schemas.microsoft.com/office/drawing/2014/main" id="{E04E3C65-9514-4510-95B3-8CBC80946065}"/>
+                <a16:creationId xmlns:a16="http://schemas.microsoft.com/office/drawing/2014/main" id="{0E5D7EC4-522B-433D-92B6-CC8DA4B76253}"/>
               </a:ext>
             </a:extLst>
           </p:cNvPr>
@@ -1171,7 +1173,7 @@
           <p:cNvPr id="6" name="Espaço Reservado para Número de Slide 5">
             <a:extLst>
               <a:ext uri="{FF2B5EF4-FFF2-40B4-BE49-F238E27FC236}">
-                <a16:creationId xmlns:a16="http://schemas.microsoft.com/office/drawing/2014/main" id="{7C9315FB-2039-47EC-ABA7-79A8A8A94F09}"/>
+                <a16:creationId xmlns:a16="http://schemas.microsoft.com/office/drawing/2014/main" id="{3ED5CB65-820F-4C84-9CBB-3C3C2BB28215}"/>
               </a:ext>
             </a:extLst>
           </p:cNvPr>
@@ -1187,7 +1189,7 @@
           <a:bodyPr/>
           <a:lstStyle/>
           <a:p>
-            <a:fld id="{9EDD5F49-AB6D-44D5-B832-F428163E8AB2}" type="slidenum">
+            <a:fld id="{A55E18BB-735D-482A-ABC0-87C3B8A5657F}" type="slidenum">
               <a:rPr lang="pt-BR" smtClean="0"/>
               <a:t>‹nº›</a:t>
             </a:fld>
@@ -1198,7 +1200,7 @@
     </p:spTree>
     <p:extLst>
       <p:ext uri="{BB962C8B-B14F-4D97-AF65-F5344CB8AC3E}">
-        <p14:creationId xmlns:p14="http://schemas.microsoft.com/office/powerpoint/2010/main" val="1844191275"/>
+        <p14:creationId xmlns:p14="http://schemas.microsoft.com/office/powerpoint/2010/main" val="3419122117"/>
       </p:ext>
     </p:extLst>
   </p:cSld>
@@ -1230,7 +1232,7 @@
           <p:cNvPr id="2" name="Título 1">
             <a:extLst>
               <a:ext uri="{FF2B5EF4-FFF2-40B4-BE49-F238E27FC236}">
-                <a16:creationId xmlns:a16="http://schemas.microsoft.com/office/drawing/2014/main" id="{A37F154B-1043-4EDF-8F30-24AE91AD657B}"/>
+                <a16:creationId xmlns:a16="http://schemas.microsoft.com/office/drawing/2014/main" id="{CF3D2DE6-3143-4928-9D9C-509097ADF28F}"/>
               </a:ext>
             </a:extLst>
           </p:cNvPr>
@@ -1258,7 +1260,7 @@
           <p:cNvPr id="3" name="Espaço Reservado para Conteúdo 2">
             <a:extLst>
               <a:ext uri="{FF2B5EF4-FFF2-40B4-BE49-F238E27FC236}">
-                <a16:creationId xmlns:a16="http://schemas.microsoft.com/office/drawing/2014/main" id="{468F3A79-2CB7-4546-913E-74953475577D}"/>
+                <a16:creationId xmlns:a16="http://schemas.microsoft.com/office/drawing/2014/main" id="{1CA09F81-3BCC-4BFB-AA9C-41E41AA653DC}"/>
               </a:ext>
             </a:extLst>
           </p:cNvPr>
@@ -1320,7 +1322,7 @@
           <p:cNvPr id="4" name="Espaço Reservado para Conteúdo 3">
             <a:extLst>
               <a:ext uri="{FF2B5EF4-FFF2-40B4-BE49-F238E27FC236}">
-                <a16:creationId xmlns:a16="http://schemas.microsoft.com/office/drawing/2014/main" id="{D2F40FCF-F606-48AC-AB8E-3E13F3EC5E23}"/>
+                <a16:creationId xmlns:a16="http://schemas.microsoft.com/office/drawing/2014/main" id="{065AF94C-BAEE-47B5-85BF-F6F2C86CAC09}"/>
               </a:ext>
             </a:extLst>
           </p:cNvPr>
@@ -1382,7 +1384,7 @@
           <p:cNvPr id="5" name="Espaço Reservado para Data 4">
             <a:extLst>
               <a:ext uri="{FF2B5EF4-FFF2-40B4-BE49-F238E27FC236}">
-                <a16:creationId xmlns:a16="http://schemas.microsoft.com/office/drawing/2014/main" id="{AB19F9FA-CF4F-44BB-A6A5-740E024103A1}"/>
+                <a16:creationId xmlns:a16="http://schemas.microsoft.com/office/drawing/2014/main" id="{551E0E4F-631C-4962-A134-19BBA5ED5C3B}"/>
               </a:ext>
             </a:extLst>
           </p:cNvPr>
@@ -1398,9 +1400,9 @@
           <a:bodyPr/>
           <a:lstStyle/>
           <a:p>
-            <a:fld id="{2C9188EB-1D0E-4B79-B58B-E64712D811BA}" type="datetimeFigureOut">
+            <a:fld id="{D5492F46-3C2A-433E-96A0-25601C8A9332}" type="datetimeFigureOut">
               <a:rPr lang="pt-BR" smtClean="0"/>
-              <a:t>30/05/2021</a:t>
+              <a:t>01/06/2021</a:t>
             </a:fld>
             <a:endParaRPr lang="pt-BR"/>
           </a:p>
@@ -1411,7 +1413,7 @@
           <p:cNvPr id="6" name="Espaço Reservado para Rodapé 5">
             <a:extLst>
               <a:ext uri="{FF2B5EF4-FFF2-40B4-BE49-F238E27FC236}">
-                <a16:creationId xmlns:a16="http://schemas.microsoft.com/office/drawing/2014/main" id="{3043CAF3-EE19-4A30-B18B-66D5EA92E266}"/>
+                <a16:creationId xmlns:a16="http://schemas.microsoft.com/office/drawing/2014/main" id="{7FA103C5-33E5-4F14-8A8E-91A801DF2B53}"/>
               </a:ext>
             </a:extLst>
           </p:cNvPr>
@@ -1436,7 +1438,7 @@
           <p:cNvPr id="7" name="Espaço Reservado para Número de Slide 6">
             <a:extLst>
               <a:ext uri="{FF2B5EF4-FFF2-40B4-BE49-F238E27FC236}">
-                <a16:creationId xmlns:a16="http://schemas.microsoft.com/office/drawing/2014/main" id="{937975F3-60DD-42AC-8B51-9FA448428153}"/>
+                <a16:creationId xmlns:a16="http://schemas.microsoft.com/office/drawing/2014/main" id="{5744E781-3A2A-439B-A185-FDFC1D4F35A6}"/>
               </a:ext>
             </a:extLst>
           </p:cNvPr>
@@ -1452,7 +1454,7 @@
           <a:bodyPr/>
           <a:lstStyle/>
           <a:p>
-            <a:fld id="{9EDD5F49-AB6D-44D5-B832-F428163E8AB2}" type="slidenum">
+            <a:fld id="{A55E18BB-735D-482A-ABC0-87C3B8A5657F}" type="slidenum">
               <a:rPr lang="pt-BR" smtClean="0"/>
               <a:t>‹nº›</a:t>
             </a:fld>
@@ -1463,7 +1465,7 @@
     </p:spTree>
     <p:extLst>
       <p:ext uri="{BB962C8B-B14F-4D97-AF65-F5344CB8AC3E}">
-        <p14:creationId xmlns:p14="http://schemas.microsoft.com/office/powerpoint/2010/main" val="3918729528"/>
+        <p14:creationId xmlns:p14="http://schemas.microsoft.com/office/powerpoint/2010/main" val="2872197551"/>
       </p:ext>
     </p:extLst>
   </p:cSld>
@@ -1495,7 +1497,7 @@
           <p:cNvPr id="2" name="Título 1">
             <a:extLst>
               <a:ext uri="{FF2B5EF4-FFF2-40B4-BE49-F238E27FC236}">
-                <a16:creationId xmlns:a16="http://schemas.microsoft.com/office/drawing/2014/main" id="{D79B3872-6C1D-4DF7-84FF-6247E6C91182}"/>
+                <a16:creationId xmlns:a16="http://schemas.microsoft.com/office/drawing/2014/main" id="{618A7AE6-86EE-4B6E-A1CA-0E3A964B509E}"/>
               </a:ext>
             </a:extLst>
           </p:cNvPr>
@@ -1528,7 +1530,7 @@
           <p:cNvPr id="3" name="Espaço Reservado para Texto 2">
             <a:extLst>
               <a:ext uri="{FF2B5EF4-FFF2-40B4-BE49-F238E27FC236}">
-                <a16:creationId xmlns:a16="http://schemas.microsoft.com/office/drawing/2014/main" id="{416B4F61-49F6-4FA7-96F3-BCE57F7B75C6}"/>
+                <a16:creationId xmlns:a16="http://schemas.microsoft.com/office/drawing/2014/main" id="{594185FA-2FE5-46C7-B983-93BC8B02B96B}"/>
               </a:ext>
             </a:extLst>
           </p:cNvPr>
@@ -1599,7 +1601,7 @@
           <p:cNvPr id="4" name="Espaço Reservado para Conteúdo 3">
             <a:extLst>
               <a:ext uri="{FF2B5EF4-FFF2-40B4-BE49-F238E27FC236}">
-                <a16:creationId xmlns:a16="http://schemas.microsoft.com/office/drawing/2014/main" id="{6F5576B4-ACDC-43E5-83F7-0CA573DFE477}"/>
+                <a16:creationId xmlns:a16="http://schemas.microsoft.com/office/drawing/2014/main" id="{F4AA3CE7-1EDA-47EA-9A01-1E55C448EB1D}"/>
               </a:ext>
             </a:extLst>
           </p:cNvPr>
@@ -1661,7 +1663,7 @@
           <p:cNvPr id="5" name="Espaço Reservado para Texto 4">
             <a:extLst>
               <a:ext uri="{FF2B5EF4-FFF2-40B4-BE49-F238E27FC236}">
-                <a16:creationId xmlns:a16="http://schemas.microsoft.com/office/drawing/2014/main" id="{0DC586C5-B49A-409B-9811-596E028F101C}"/>
+                <a16:creationId xmlns:a16="http://schemas.microsoft.com/office/drawing/2014/main" id="{C3B69999-AE5A-4A37-88EF-782EB3F45298}"/>
               </a:ext>
             </a:extLst>
           </p:cNvPr>
@@ -1732,7 +1734,7 @@
           <p:cNvPr id="6" name="Espaço Reservado para Conteúdo 5">
             <a:extLst>
               <a:ext uri="{FF2B5EF4-FFF2-40B4-BE49-F238E27FC236}">
-                <a16:creationId xmlns:a16="http://schemas.microsoft.com/office/drawing/2014/main" id="{064ABC03-8487-4E75-86E6-D3CD0283A57D}"/>
+                <a16:creationId xmlns:a16="http://schemas.microsoft.com/office/drawing/2014/main" id="{D4E736A4-6DDF-4C57-BC42-467B1A46FB86}"/>
               </a:ext>
             </a:extLst>
           </p:cNvPr>
@@ -1794,7 +1796,7 @@
           <p:cNvPr id="7" name="Espaço Reservado para Data 6">
             <a:extLst>
               <a:ext uri="{FF2B5EF4-FFF2-40B4-BE49-F238E27FC236}">
-                <a16:creationId xmlns:a16="http://schemas.microsoft.com/office/drawing/2014/main" id="{B82FBC37-D7E2-4CB4-9B00-7915FE9B3557}"/>
+                <a16:creationId xmlns:a16="http://schemas.microsoft.com/office/drawing/2014/main" id="{4CA4EBB8-CEB5-4DB6-A8F2-C1F685CF127F}"/>
               </a:ext>
             </a:extLst>
           </p:cNvPr>
@@ -1810,9 +1812,9 @@
           <a:bodyPr/>
           <a:lstStyle/>
           <a:p>
-            <a:fld id="{2C9188EB-1D0E-4B79-B58B-E64712D811BA}" type="datetimeFigureOut">
+            <a:fld id="{D5492F46-3C2A-433E-96A0-25601C8A9332}" type="datetimeFigureOut">
               <a:rPr lang="pt-BR" smtClean="0"/>
-              <a:t>30/05/2021</a:t>
+              <a:t>01/06/2021</a:t>
             </a:fld>
             <a:endParaRPr lang="pt-BR"/>
           </a:p>
@@ -1823,7 +1825,7 @@
           <p:cNvPr id="8" name="Espaço Reservado para Rodapé 7">
             <a:extLst>
               <a:ext uri="{FF2B5EF4-FFF2-40B4-BE49-F238E27FC236}">
-                <a16:creationId xmlns:a16="http://schemas.microsoft.com/office/drawing/2014/main" id="{C7549B0C-E33F-49D5-A1BC-1000C61BE251}"/>
+                <a16:creationId xmlns:a16="http://schemas.microsoft.com/office/drawing/2014/main" id="{5D50E1D1-D802-4403-AEA0-D051F1BF88C7}"/>
               </a:ext>
             </a:extLst>
           </p:cNvPr>
@@ -1848,7 +1850,7 @@
           <p:cNvPr id="9" name="Espaço Reservado para Número de Slide 8">
             <a:extLst>
               <a:ext uri="{FF2B5EF4-FFF2-40B4-BE49-F238E27FC236}">
-                <a16:creationId xmlns:a16="http://schemas.microsoft.com/office/drawing/2014/main" id="{ECB2DB0F-2CB7-41ED-A51E-B6D88A3FB397}"/>
+                <a16:creationId xmlns:a16="http://schemas.microsoft.com/office/drawing/2014/main" id="{B0C2A3F7-7AE8-4FC4-9540-400CF381AD58}"/>
               </a:ext>
             </a:extLst>
           </p:cNvPr>
@@ -1864,7 +1866,7 @@
           <a:bodyPr/>
           <a:lstStyle/>
           <a:p>
-            <a:fld id="{9EDD5F49-AB6D-44D5-B832-F428163E8AB2}" type="slidenum">
+            <a:fld id="{A55E18BB-735D-482A-ABC0-87C3B8A5657F}" type="slidenum">
               <a:rPr lang="pt-BR" smtClean="0"/>
               <a:t>‹nº›</a:t>
             </a:fld>
@@ -1875,7 +1877,7 @@
     </p:spTree>
     <p:extLst>
       <p:ext uri="{BB962C8B-B14F-4D97-AF65-F5344CB8AC3E}">
-        <p14:creationId xmlns:p14="http://schemas.microsoft.com/office/powerpoint/2010/main" val="1491272354"/>
+        <p14:creationId xmlns:p14="http://schemas.microsoft.com/office/powerpoint/2010/main" val="956789321"/>
       </p:ext>
     </p:extLst>
   </p:cSld>
@@ -1907,7 +1909,7 @@
           <p:cNvPr id="2" name="Título 1">
             <a:extLst>
               <a:ext uri="{FF2B5EF4-FFF2-40B4-BE49-F238E27FC236}">
-                <a16:creationId xmlns:a16="http://schemas.microsoft.com/office/drawing/2014/main" id="{2B68ADFA-1214-4358-B02A-89B5E1807FB2}"/>
+                <a16:creationId xmlns:a16="http://schemas.microsoft.com/office/drawing/2014/main" id="{D1ECB474-A826-42B3-A7A4-151679734148}"/>
               </a:ext>
             </a:extLst>
           </p:cNvPr>
@@ -1935,7 +1937,7 @@
           <p:cNvPr id="3" name="Espaço Reservado para Data 2">
             <a:extLst>
               <a:ext uri="{FF2B5EF4-FFF2-40B4-BE49-F238E27FC236}">
-                <a16:creationId xmlns:a16="http://schemas.microsoft.com/office/drawing/2014/main" id="{6FAECD9B-A39A-4467-946D-C3D913982A93}"/>
+                <a16:creationId xmlns:a16="http://schemas.microsoft.com/office/drawing/2014/main" id="{78796ED6-6614-464A-80D6-86BAD1CF5C59}"/>
               </a:ext>
             </a:extLst>
           </p:cNvPr>
@@ -1951,9 +1953,9 @@
           <a:bodyPr/>
           <a:lstStyle/>
           <a:p>
-            <a:fld id="{2C9188EB-1D0E-4B79-B58B-E64712D811BA}" type="datetimeFigureOut">
+            <a:fld id="{D5492F46-3C2A-433E-96A0-25601C8A9332}" type="datetimeFigureOut">
               <a:rPr lang="pt-BR" smtClean="0"/>
-              <a:t>30/05/2021</a:t>
+              <a:t>01/06/2021</a:t>
             </a:fld>
             <a:endParaRPr lang="pt-BR"/>
           </a:p>
@@ -1964,7 +1966,7 @@
           <p:cNvPr id="4" name="Espaço Reservado para Rodapé 3">
             <a:extLst>
               <a:ext uri="{FF2B5EF4-FFF2-40B4-BE49-F238E27FC236}">
-                <a16:creationId xmlns:a16="http://schemas.microsoft.com/office/drawing/2014/main" id="{0B93366D-DA3C-4012-8E7A-7252894FB783}"/>
+                <a16:creationId xmlns:a16="http://schemas.microsoft.com/office/drawing/2014/main" id="{018E3851-94E8-4708-B41D-D12BF4AF4BB1}"/>
               </a:ext>
             </a:extLst>
           </p:cNvPr>
@@ -1989,7 +1991,7 @@
           <p:cNvPr id="5" name="Espaço Reservado para Número de Slide 4">
             <a:extLst>
               <a:ext uri="{FF2B5EF4-FFF2-40B4-BE49-F238E27FC236}">
-                <a16:creationId xmlns:a16="http://schemas.microsoft.com/office/drawing/2014/main" id="{C282E099-1996-4723-9979-48EBF2DE7F77}"/>
+                <a16:creationId xmlns:a16="http://schemas.microsoft.com/office/drawing/2014/main" id="{0D6CC01E-444C-41E8-81D5-83DB49BE265A}"/>
               </a:ext>
             </a:extLst>
           </p:cNvPr>
@@ -2005,7 +2007,7 @@
           <a:bodyPr/>
           <a:lstStyle/>
           <a:p>
-            <a:fld id="{9EDD5F49-AB6D-44D5-B832-F428163E8AB2}" type="slidenum">
+            <a:fld id="{A55E18BB-735D-482A-ABC0-87C3B8A5657F}" type="slidenum">
               <a:rPr lang="pt-BR" smtClean="0"/>
               <a:t>‹nº›</a:t>
             </a:fld>
@@ -2016,7 +2018,7 @@
     </p:spTree>
     <p:extLst>
       <p:ext uri="{BB962C8B-B14F-4D97-AF65-F5344CB8AC3E}">
-        <p14:creationId xmlns:p14="http://schemas.microsoft.com/office/powerpoint/2010/main" val="4010744501"/>
+        <p14:creationId xmlns:p14="http://schemas.microsoft.com/office/powerpoint/2010/main" val="1527597032"/>
       </p:ext>
     </p:extLst>
   </p:cSld>
@@ -2048,7 +2050,7 @@
           <p:cNvPr id="2" name="Espaço Reservado para Data 1">
             <a:extLst>
               <a:ext uri="{FF2B5EF4-FFF2-40B4-BE49-F238E27FC236}">
-                <a16:creationId xmlns:a16="http://schemas.microsoft.com/office/drawing/2014/main" id="{553461B4-DF68-4BCF-9106-0F0533F2CDBE}"/>
+                <a16:creationId xmlns:a16="http://schemas.microsoft.com/office/drawing/2014/main" id="{326B2E83-7D04-4059-BF10-9885B70CAD47}"/>
               </a:ext>
             </a:extLst>
           </p:cNvPr>
@@ -2064,9 +2066,9 @@
           <a:bodyPr/>
           <a:lstStyle/>
           <a:p>
-            <a:fld id="{2C9188EB-1D0E-4B79-B58B-E64712D811BA}" type="datetimeFigureOut">
+            <a:fld id="{D5492F46-3C2A-433E-96A0-25601C8A9332}" type="datetimeFigureOut">
               <a:rPr lang="pt-BR" smtClean="0"/>
-              <a:t>30/05/2021</a:t>
+              <a:t>01/06/2021</a:t>
             </a:fld>
             <a:endParaRPr lang="pt-BR"/>
           </a:p>
@@ -2077,7 +2079,7 @@
           <p:cNvPr id="3" name="Espaço Reservado para Rodapé 2">
             <a:extLst>
               <a:ext uri="{FF2B5EF4-FFF2-40B4-BE49-F238E27FC236}">
-                <a16:creationId xmlns:a16="http://schemas.microsoft.com/office/drawing/2014/main" id="{0B358037-35D8-46B1-B188-17801B5B7B43}"/>
+                <a16:creationId xmlns:a16="http://schemas.microsoft.com/office/drawing/2014/main" id="{68CD609A-248A-4B59-A66F-81F920AAE73E}"/>
               </a:ext>
             </a:extLst>
           </p:cNvPr>
@@ -2102,7 +2104,7 @@
           <p:cNvPr id="4" name="Espaço Reservado para Número de Slide 3">
             <a:extLst>
               <a:ext uri="{FF2B5EF4-FFF2-40B4-BE49-F238E27FC236}">
-                <a16:creationId xmlns:a16="http://schemas.microsoft.com/office/drawing/2014/main" id="{36BCF2E9-A912-4202-A09E-08CE818EB1C8}"/>
+                <a16:creationId xmlns:a16="http://schemas.microsoft.com/office/drawing/2014/main" id="{677A89D7-AC23-4C03-B4AD-7F72897ED17D}"/>
               </a:ext>
             </a:extLst>
           </p:cNvPr>
@@ -2118,7 +2120,7 @@
           <a:bodyPr/>
           <a:lstStyle/>
           <a:p>
-            <a:fld id="{9EDD5F49-AB6D-44D5-B832-F428163E8AB2}" type="slidenum">
+            <a:fld id="{A55E18BB-735D-482A-ABC0-87C3B8A5657F}" type="slidenum">
               <a:rPr lang="pt-BR" smtClean="0"/>
               <a:t>‹nº›</a:t>
             </a:fld>
@@ -2129,7 +2131,7 @@
     </p:spTree>
     <p:extLst>
       <p:ext uri="{BB962C8B-B14F-4D97-AF65-F5344CB8AC3E}">
-        <p14:creationId xmlns:p14="http://schemas.microsoft.com/office/powerpoint/2010/main" val="200523155"/>
+        <p14:creationId xmlns:p14="http://schemas.microsoft.com/office/powerpoint/2010/main" val="755425908"/>
       </p:ext>
     </p:extLst>
   </p:cSld>
@@ -2161,7 +2163,7 @@
           <p:cNvPr id="2" name="Título 1">
             <a:extLst>
               <a:ext uri="{FF2B5EF4-FFF2-40B4-BE49-F238E27FC236}">
-                <a16:creationId xmlns:a16="http://schemas.microsoft.com/office/drawing/2014/main" id="{175825F9-1D5B-4E14-AF36-A2416421145C}"/>
+                <a16:creationId xmlns:a16="http://schemas.microsoft.com/office/drawing/2014/main" id="{14FDDB87-7B06-4EE3-9BF9-FC532317D416}"/>
               </a:ext>
             </a:extLst>
           </p:cNvPr>
@@ -2198,7 +2200,7 @@
           <p:cNvPr id="3" name="Espaço Reservado para Conteúdo 2">
             <a:extLst>
               <a:ext uri="{FF2B5EF4-FFF2-40B4-BE49-F238E27FC236}">
-                <a16:creationId xmlns:a16="http://schemas.microsoft.com/office/drawing/2014/main" id="{D67B8391-406B-4E1F-981F-8FEE53B16B5E}"/>
+                <a16:creationId xmlns:a16="http://schemas.microsoft.com/office/drawing/2014/main" id="{06EF6068-10DD-4A36-9F7F-CA12206EEB92}"/>
               </a:ext>
             </a:extLst>
           </p:cNvPr>
@@ -2288,7 +2290,7 @@
           <p:cNvPr id="4" name="Espaço Reservado para Texto 3">
             <a:extLst>
               <a:ext uri="{FF2B5EF4-FFF2-40B4-BE49-F238E27FC236}">
-                <a16:creationId xmlns:a16="http://schemas.microsoft.com/office/drawing/2014/main" id="{7E3E16F1-F139-4F0A-B77D-F41CD4B9DADF}"/>
+                <a16:creationId xmlns:a16="http://schemas.microsoft.com/office/drawing/2014/main" id="{051A438E-AB6A-41B4-900F-363BB061401A}"/>
               </a:ext>
             </a:extLst>
           </p:cNvPr>
@@ -2359,7 +2361,7 @@
           <p:cNvPr id="5" name="Espaço Reservado para Data 4">
             <a:extLst>
               <a:ext uri="{FF2B5EF4-FFF2-40B4-BE49-F238E27FC236}">
-                <a16:creationId xmlns:a16="http://schemas.microsoft.com/office/drawing/2014/main" id="{DF0F562A-476A-47BC-8FC2-2526C484B3AA}"/>
+                <a16:creationId xmlns:a16="http://schemas.microsoft.com/office/drawing/2014/main" id="{7CD81837-B248-48CD-86E8-5FDD95AF2E6E}"/>
               </a:ext>
             </a:extLst>
           </p:cNvPr>
@@ -2375,9 +2377,9 @@
           <a:bodyPr/>
           <a:lstStyle/>
           <a:p>
-            <a:fld id="{2C9188EB-1D0E-4B79-B58B-E64712D811BA}" type="datetimeFigureOut">
+            <a:fld id="{D5492F46-3C2A-433E-96A0-25601C8A9332}" type="datetimeFigureOut">
               <a:rPr lang="pt-BR" smtClean="0"/>
-              <a:t>30/05/2021</a:t>
+              <a:t>01/06/2021</a:t>
             </a:fld>
             <a:endParaRPr lang="pt-BR"/>
           </a:p>
@@ -2388,7 +2390,7 @@
           <p:cNvPr id="6" name="Espaço Reservado para Rodapé 5">
             <a:extLst>
               <a:ext uri="{FF2B5EF4-FFF2-40B4-BE49-F238E27FC236}">
-                <a16:creationId xmlns:a16="http://schemas.microsoft.com/office/drawing/2014/main" id="{05EB1884-160D-4D41-A284-3528E7023CA7}"/>
+                <a16:creationId xmlns:a16="http://schemas.microsoft.com/office/drawing/2014/main" id="{42EF60A9-F448-46A5-A543-3EA4F1BE0A84}"/>
               </a:ext>
             </a:extLst>
           </p:cNvPr>
@@ -2413,7 +2415,7 @@
           <p:cNvPr id="7" name="Espaço Reservado para Número de Slide 6">
             <a:extLst>
               <a:ext uri="{FF2B5EF4-FFF2-40B4-BE49-F238E27FC236}">
-                <a16:creationId xmlns:a16="http://schemas.microsoft.com/office/drawing/2014/main" id="{D4A3066C-B885-497E-A1EA-D3D1305213F6}"/>
+                <a16:creationId xmlns:a16="http://schemas.microsoft.com/office/drawing/2014/main" id="{7B6AE0D9-EEFB-4D27-B625-4489DDBB0484}"/>
               </a:ext>
             </a:extLst>
           </p:cNvPr>
@@ -2429,7 +2431,7 @@
           <a:bodyPr/>
           <a:lstStyle/>
           <a:p>
-            <a:fld id="{9EDD5F49-AB6D-44D5-B832-F428163E8AB2}" type="slidenum">
+            <a:fld id="{A55E18BB-735D-482A-ABC0-87C3B8A5657F}" type="slidenum">
               <a:rPr lang="pt-BR" smtClean="0"/>
               <a:t>‹nº›</a:t>
             </a:fld>
@@ -2440,7 +2442,7 @@
     </p:spTree>
     <p:extLst>
       <p:ext uri="{BB962C8B-B14F-4D97-AF65-F5344CB8AC3E}">
-        <p14:creationId xmlns:p14="http://schemas.microsoft.com/office/powerpoint/2010/main" val="1142369931"/>
+        <p14:creationId xmlns:p14="http://schemas.microsoft.com/office/powerpoint/2010/main" val="1634047676"/>
       </p:ext>
     </p:extLst>
   </p:cSld>
@@ -2472,7 +2474,7 @@
           <p:cNvPr id="2" name="Título 1">
             <a:extLst>
               <a:ext uri="{FF2B5EF4-FFF2-40B4-BE49-F238E27FC236}">
-                <a16:creationId xmlns:a16="http://schemas.microsoft.com/office/drawing/2014/main" id="{22123184-2DA3-4BD4-8C53-7E8698662363}"/>
+                <a16:creationId xmlns:a16="http://schemas.microsoft.com/office/drawing/2014/main" id="{03BE40DE-6F89-45CA-B0CC-68726E0136EB}"/>
               </a:ext>
             </a:extLst>
           </p:cNvPr>
@@ -2509,7 +2511,7 @@
           <p:cNvPr id="3" name="Espaço Reservado para Imagem 2">
             <a:extLst>
               <a:ext uri="{FF2B5EF4-FFF2-40B4-BE49-F238E27FC236}">
-                <a16:creationId xmlns:a16="http://schemas.microsoft.com/office/drawing/2014/main" id="{C91A0477-C215-4E3D-883F-808E284C9A2B}"/>
+                <a16:creationId xmlns:a16="http://schemas.microsoft.com/office/drawing/2014/main" id="{3B828DAB-DB2B-4B08-BC33-4013106739E1}"/>
               </a:ext>
             </a:extLst>
           </p:cNvPr>
@@ -2576,7 +2578,7 @@
           <p:cNvPr id="4" name="Espaço Reservado para Texto 3">
             <a:extLst>
               <a:ext uri="{FF2B5EF4-FFF2-40B4-BE49-F238E27FC236}">
-                <a16:creationId xmlns:a16="http://schemas.microsoft.com/office/drawing/2014/main" id="{F9BD8035-4CAE-41C4-AA72-11B65E302602}"/>
+                <a16:creationId xmlns:a16="http://schemas.microsoft.com/office/drawing/2014/main" id="{6F3F0F04-069D-48C2-8E9E-9C3F5BA7D90C}"/>
               </a:ext>
             </a:extLst>
           </p:cNvPr>
@@ -2647,7 +2649,7 @@
           <p:cNvPr id="5" name="Espaço Reservado para Data 4">
             <a:extLst>
               <a:ext uri="{FF2B5EF4-FFF2-40B4-BE49-F238E27FC236}">
-                <a16:creationId xmlns:a16="http://schemas.microsoft.com/office/drawing/2014/main" id="{90F4D330-6E23-4D86-A11A-5358ECF17FD1}"/>
+                <a16:creationId xmlns:a16="http://schemas.microsoft.com/office/drawing/2014/main" id="{3CB6AB27-8CBC-46AC-97FC-639B6CDD0B30}"/>
               </a:ext>
             </a:extLst>
           </p:cNvPr>
@@ -2663,9 +2665,9 @@
           <a:bodyPr/>
           <a:lstStyle/>
           <a:p>
-            <a:fld id="{2C9188EB-1D0E-4B79-B58B-E64712D811BA}" type="datetimeFigureOut">
+            <a:fld id="{D5492F46-3C2A-433E-96A0-25601C8A9332}" type="datetimeFigureOut">
               <a:rPr lang="pt-BR" smtClean="0"/>
-              <a:t>30/05/2021</a:t>
+              <a:t>01/06/2021</a:t>
             </a:fld>
             <a:endParaRPr lang="pt-BR"/>
           </a:p>
@@ -2676,7 +2678,7 @@
           <p:cNvPr id="6" name="Espaço Reservado para Rodapé 5">
             <a:extLst>
               <a:ext uri="{FF2B5EF4-FFF2-40B4-BE49-F238E27FC236}">
-                <a16:creationId xmlns:a16="http://schemas.microsoft.com/office/drawing/2014/main" id="{C2B71151-F130-4DBE-86EF-6AA5615EAC34}"/>
+                <a16:creationId xmlns:a16="http://schemas.microsoft.com/office/drawing/2014/main" id="{4C394295-E7BC-40CD-A72E-8CCB346D8EA0}"/>
               </a:ext>
             </a:extLst>
           </p:cNvPr>
@@ -2701,7 +2703,7 @@
           <p:cNvPr id="7" name="Espaço Reservado para Número de Slide 6">
             <a:extLst>
               <a:ext uri="{FF2B5EF4-FFF2-40B4-BE49-F238E27FC236}">
-                <a16:creationId xmlns:a16="http://schemas.microsoft.com/office/drawing/2014/main" id="{2138ED81-AB04-4BAD-95FA-EFC2D0167DB4}"/>
+                <a16:creationId xmlns:a16="http://schemas.microsoft.com/office/drawing/2014/main" id="{B58C8795-7682-4BD2-A485-E26B911765DD}"/>
               </a:ext>
             </a:extLst>
           </p:cNvPr>
@@ -2717,7 +2719,7 @@
           <a:bodyPr/>
           <a:lstStyle/>
           <a:p>
-            <a:fld id="{9EDD5F49-AB6D-44D5-B832-F428163E8AB2}" type="slidenum">
+            <a:fld id="{A55E18BB-735D-482A-ABC0-87C3B8A5657F}" type="slidenum">
               <a:rPr lang="pt-BR" smtClean="0"/>
               <a:t>‹nº›</a:t>
             </a:fld>
@@ -2728,7 +2730,7 @@
     </p:spTree>
     <p:extLst>
       <p:ext uri="{BB962C8B-B14F-4D97-AF65-F5344CB8AC3E}">
-        <p14:creationId xmlns:p14="http://schemas.microsoft.com/office/powerpoint/2010/main" val="2255883000"/>
+        <p14:creationId xmlns:p14="http://schemas.microsoft.com/office/powerpoint/2010/main" val="2452976479"/>
       </p:ext>
     </p:extLst>
   </p:cSld>
@@ -2742,12 +2744,9 @@
 <p:sldMaster xmlns:a="http://schemas.openxmlformats.org/drawingml/2006/main" xmlns:r="http://schemas.openxmlformats.org/officeDocument/2006/relationships" xmlns:p="http://schemas.openxmlformats.org/presentationml/2006/main">
   <p:cSld>
     <p:bg>
-      <p:bgPr>
-        <a:solidFill>
-          <a:srgbClr val="120043"/>
-        </a:solidFill>
-        <a:effectLst/>
-      </p:bgPr>
+      <p:bgRef idx="1001">
+        <a:schemeClr val="bg1"/>
+      </p:bgRef>
     </p:bg>
     <p:spTree>
       <p:nvGrpSpPr>
@@ -2768,7 +2767,7 @@
           <p:cNvPr id="2" name="Espaço Reservado para Título 1">
             <a:extLst>
               <a:ext uri="{FF2B5EF4-FFF2-40B4-BE49-F238E27FC236}">
-                <a16:creationId xmlns:a16="http://schemas.microsoft.com/office/drawing/2014/main" id="{C6385DC7-954E-4569-8498-7CA10B3ABE28}"/>
+                <a16:creationId xmlns:a16="http://schemas.microsoft.com/office/drawing/2014/main" id="{9AD62D3B-4B83-48C8-9236-44954711011D}"/>
               </a:ext>
             </a:extLst>
           </p:cNvPr>
@@ -2806,7 +2805,7 @@
           <p:cNvPr id="3" name="Espaço Reservado para Texto 2">
             <a:extLst>
               <a:ext uri="{FF2B5EF4-FFF2-40B4-BE49-F238E27FC236}">
-                <a16:creationId xmlns:a16="http://schemas.microsoft.com/office/drawing/2014/main" id="{0227BF54-019D-4FC2-8836-8CFE9768587B}"/>
+                <a16:creationId xmlns:a16="http://schemas.microsoft.com/office/drawing/2014/main" id="{D9969486-7783-43C0-8C36-3088D633B6C9}"/>
               </a:ext>
             </a:extLst>
           </p:cNvPr>
@@ -2873,7 +2872,7 @@
           <p:cNvPr id="4" name="Espaço Reservado para Data 3">
             <a:extLst>
               <a:ext uri="{FF2B5EF4-FFF2-40B4-BE49-F238E27FC236}">
-                <a16:creationId xmlns:a16="http://schemas.microsoft.com/office/drawing/2014/main" id="{623DC7CF-FC18-42B0-8547-3F025D05CCAD}"/>
+                <a16:creationId xmlns:a16="http://schemas.microsoft.com/office/drawing/2014/main" id="{CB9F9DAE-5C90-4CC5-B83C-395E9082C5AF}"/>
               </a:ext>
             </a:extLst>
           </p:cNvPr>
@@ -2907,9 +2906,9 @@
             </a:lvl1pPr>
           </a:lstStyle>
           <a:p>
-            <a:fld id="{2C9188EB-1D0E-4B79-B58B-E64712D811BA}" type="datetimeFigureOut">
+            <a:fld id="{D5492F46-3C2A-433E-96A0-25601C8A9332}" type="datetimeFigureOut">
               <a:rPr lang="pt-BR" smtClean="0"/>
-              <a:t>30/05/2021</a:t>
+              <a:t>01/06/2021</a:t>
             </a:fld>
             <a:endParaRPr lang="pt-BR"/>
           </a:p>
@@ -2920,7 +2919,7 @@
           <p:cNvPr id="5" name="Espaço Reservado para Rodapé 4">
             <a:extLst>
               <a:ext uri="{FF2B5EF4-FFF2-40B4-BE49-F238E27FC236}">
-                <a16:creationId xmlns:a16="http://schemas.microsoft.com/office/drawing/2014/main" id="{BE9C807F-9FF9-4846-8935-24843FE60035}"/>
+                <a16:creationId xmlns:a16="http://schemas.microsoft.com/office/drawing/2014/main" id="{B57F36C1-12BD-4B05-B4FC-8E6D6C44E81D}"/>
               </a:ext>
             </a:extLst>
           </p:cNvPr>
@@ -2963,7 +2962,7 @@
           <p:cNvPr id="6" name="Espaço Reservado para Número de Slide 5">
             <a:extLst>
               <a:ext uri="{FF2B5EF4-FFF2-40B4-BE49-F238E27FC236}">
-                <a16:creationId xmlns:a16="http://schemas.microsoft.com/office/drawing/2014/main" id="{449ED9ED-3592-4BFA-93E7-26215599AB86}"/>
+                <a16:creationId xmlns:a16="http://schemas.microsoft.com/office/drawing/2014/main" id="{6230FF50-A1F6-4D39-A4A5-F7FC6BB46F1B}"/>
               </a:ext>
             </a:extLst>
           </p:cNvPr>
@@ -2997,7 +2996,7 @@
             </a:lvl1pPr>
           </a:lstStyle>
           <a:p>
-            <a:fld id="{9EDD5F49-AB6D-44D5-B832-F428163E8AB2}" type="slidenum">
+            <a:fld id="{A55E18BB-735D-482A-ABC0-87C3B8A5657F}" type="slidenum">
               <a:rPr lang="pt-BR" smtClean="0"/>
               <a:t>‹nº›</a:t>
             </a:fld>
@@ -3008,7 +3007,7 @@
     </p:spTree>
     <p:extLst>
       <p:ext uri="{BB962C8B-B14F-4D97-AF65-F5344CB8AC3E}">
-        <p14:creationId xmlns:p14="http://schemas.microsoft.com/office/powerpoint/2010/main" val="3003044819"/>
+        <p14:creationId xmlns:p14="http://schemas.microsoft.com/office/powerpoint/2010/main" val="1219533568"/>
       </p:ext>
     </p:extLst>
   </p:cSld>
@@ -3328,180 +3327,38 @@
       </p:grpSpPr>
       <p:pic>
         <p:nvPicPr>
-          <p:cNvPr id="1026" name="Picture 2">
-            <a:extLst>
-              <a:ext uri="{FF2B5EF4-FFF2-40B4-BE49-F238E27FC236}">
-                <a16:creationId xmlns:a16="http://schemas.microsoft.com/office/drawing/2014/main" id="{2D6828C8-1AB4-4F56-B0AD-B931B9F62B98}"/>
+          <p:cNvPr id="8" name="Imagem 7">
+            <a:extLst>
+              <a:ext uri="{FF2B5EF4-FFF2-40B4-BE49-F238E27FC236}">
+                <a16:creationId xmlns:a16="http://schemas.microsoft.com/office/drawing/2014/main" id="{6E55C79E-DEE4-4025-80AA-9FED0A895C1D}"/>
               </a:ext>
             </a:extLst>
           </p:cNvPr>
           <p:cNvPicPr>
-            <a:picLocks noChangeAspect="1" noChangeArrowheads="1"/>
+            <a:picLocks noChangeAspect="1"/>
           </p:cNvPicPr>
           <p:nvPr/>
         </p:nvPicPr>
         <p:blipFill>
-          <a:blip r:embed="rId2">
-            <a:extLst>
-              <a:ext uri="{28A0092B-C50C-407E-A947-70E740481C1C}">
-                <a14:useLocalDpi xmlns:a14="http://schemas.microsoft.com/office/drawing/2010/main" val="0"/>
-              </a:ext>
-            </a:extLst>
-          </a:blip>
-          <a:srcRect/>
+          <a:blip r:embed="rId2"/>
           <a:stretch>
             <a:fillRect/>
           </a:stretch>
         </p:blipFill>
-        <p:spPr bwMode="auto">
+        <p:spPr>
           <a:xfrm>
-            <a:off x="4899524" y="1483667"/>
-            <a:ext cx="7292476" cy="5497033"/>
+            <a:off x="0" y="-19328"/>
+            <a:ext cx="12192000" cy="6896656"/>
           </a:xfrm>
           <a:prstGeom prst="rect">
             <a:avLst/>
           </a:prstGeom>
-          <a:noFill/>
-          <a:extLst>
-            <a:ext uri="{909E8E84-426E-40DD-AFC4-6F175D3DCCD1}">
-              <a14:hiddenFill xmlns:a14="http://schemas.microsoft.com/office/drawing/2010/main">
-                <a:solidFill>
-                  <a:srgbClr val="FFFFFF"/>
-                </a:solidFill>
-              </a14:hiddenFill>
-            </a:ext>
-          </a:extLst>
         </p:spPr>
       </p:pic>
-      <p:sp>
-        <p:nvSpPr>
-          <p:cNvPr id="4" name="CaixaDeTexto 3">
-            <a:extLst>
-              <a:ext uri="{FF2B5EF4-FFF2-40B4-BE49-F238E27FC236}">
-                <a16:creationId xmlns:a16="http://schemas.microsoft.com/office/drawing/2014/main" id="{98B99AAB-A50F-49B2-82B0-3F3EAFC1944F}"/>
-              </a:ext>
-            </a:extLst>
-          </p:cNvPr>
-          <p:cNvSpPr txBox="1"/>
-          <p:nvPr/>
-        </p:nvSpPr>
-        <p:spPr>
-          <a:xfrm>
-            <a:off x="182655" y="821948"/>
-            <a:ext cx="7293600" cy="1323439"/>
-          </a:xfrm>
-          <a:prstGeom prst="rect">
-            <a:avLst/>
-          </a:prstGeom>
-          <a:noFill/>
-        </p:spPr>
-        <p:txBody>
-          <a:bodyPr wrap="none" rtlCol="0">
-            <a:spAutoFit/>
-          </a:bodyPr>
-          <a:lstStyle/>
-          <a:p>
-            <a:r>
-              <a:rPr lang="pt-BR" sz="8000" dirty="0">
-                <a:solidFill>
-                  <a:schemeClr val="bg1"/>
-                </a:solidFill>
-              </a:rPr>
-              <a:t>Realidade Virtual</a:t>
-            </a:r>
-          </a:p>
-        </p:txBody>
-      </p:sp>
-      <p:sp>
-        <p:nvSpPr>
-          <p:cNvPr id="5" name="CaixaDeTexto 4">
-            <a:extLst>
-              <a:ext uri="{FF2B5EF4-FFF2-40B4-BE49-F238E27FC236}">
-                <a16:creationId xmlns:a16="http://schemas.microsoft.com/office/drawing/2014/main" id="{7F9CAEF1-3A4F-45E5-B7C6-E6E55F1DC107}"/>
-              </a:ext>
-            </a:extLst>
-          </p:cNvPr>
-          <p:cNvSpPr txBox="1"/>
-          <p:nvPr/>
-        </p:nvSpPr>
-        <p:spPr>
-          <a:xfrm>
-            <a:off x="239805" y="1914554"/>
-            <a:ext cx="2897436" cy="461665"/>
-          </a:xfrm>
-          <a:prstGeom prst="rect">
-            <a:avLst/>
-          </a:prstGeom>
-          <a:noFill/>
-        </p:spPr>
-        <p:txBody>
-          <a:bodyPr wrap="square" rtlCol="0">
-            <a:spAutoFit/>
-          </a:bodyPr>
-          <a:lstStyle/>
-          <a:p>
-            <a:r>
-              <a:rPr lang="pt-BR" sz="2400" dirty="0">
-                <a:solidFill>
-                  <a:schemeClr val="bg1"/>
-                </a:solidFill>
-              </a:rPr>
-              <a:t>Rony Alves Sobral</a:t>
-            </a:r>
-          </a:p>
-        </p:txBody>
-      </p:sp>
-      <p:sp>
-        <p:nvSpPr>
-          <p:cNvPr id="7" name="CaixaDeTexto 6">
-            <a:extLst>
-              <a:ext uri="{FF2B5EF4-FFF2-40B4-BE49-F238E27FC236}">
-                <a16:creationId xmlns:a16="http://schemas.microsoft.com/office/drawing/2014/main" id="{563A7812-4E44-4A43-9F9D-D360BE58884D}"/>
-              </a:ext>
-            </a:extLst>
-          </p:cNvPr>
-          <p:cNvSpPr txBox="1"/>
-          <p:nvPr/>
-        </p:nvSpPr>
-        <p:spPr>
-          <a:xfrm>
-            <a:off x="10829581" y="6112345"/>
-            <a:ext cx="1211855" cy="338554"/>
-          </a:xfrm>
-          <a:prstGeom prst="rect">
-            <a:avLst/>
-          </a:prstGeom>
-          <a:noFill/>
-        </p:spPr>
-        <p:txBody>
-          <a:bodyPr wrap="square" rtlCol="0">
-            <a:spAutoFit/>
-          </a:bodyPr>
-          <a:lstStyle/>
-          <a:p>
-            <a:r>
-              <a:rPr lang="pt-BR" sz="1600" dirty="0" err="1">
-                <a:solidFill>
-                  <a:srgbClr val="1D0070"/>
-                </a:solidFill>
-              </a:rPr>
-              <a:t>By</a:t>
-            </a:r>
-            <a:r>
-              <a:rPr lang="pt-BR" sz="1600" dirty="0">
-                <a:solidFill>
-                  <a:srgbClr val="1D0070"/>
-                </a:solidFill>
-              </a:rPr>
-              <a:t> Zahidul</a:t>
-            </a:r>
-          </a:p>
-        </p:txBody>
-      </p:sp>
     </p:spTree>
     <p:extLst>
       <p:ext uri="{BB962C8B-B14F-4D97-AF65-F5344CB8AC3E}">
-        <p14:creationId xmlns:p14="http://schemas.microsoft.com/office/powerpoint/2010/main" val="4023735176"/>
+        <p14:creationId xmlns:p14="http://schemas.microsoft.com/office/powerpoint/2010/main" val="1372020545"/>
       </p:ext>
     </p:extLst>
   </p:cSld>
@@ -3528,251 +3385,40 @@
           <a:chExt cx="0" cy="0"/>
         </a:xfrm>
       </p:grpSpPr>
-      <p:sp>
-        <p:nvSpPr>
-          <p:cNvPr id="8" name="CaixaDeTexto 7">
-            <a:extLst>
-              <a:ext uri="{FF2B5EF4-FFF2-40B4-BE49-F238E27FC236}">
-                <a16:creationId xmlns:a16="http://schemas.microsoft.com/office/drawing/2014/main" id="{EF0E63DD-3369-45E2-A303-438077D8D9D3}"/>
-              </a:ext>
-            </a:extLst>
-          </p:cNvPr>
-          <p:cNvSpPr txBox="1"/>
+      <p:pic>
+        <p:nvPicPr>
+          <p:cNvPr id="4" name="Imagem 3">
+            <a:extLst>
+              <a:ext uri="{FF2B5EF4-FFF2-40B4-BE49-F238E27FC236}">
+                <a16:creationId xmlns:a16="http://schemas.microsoft.com/office/drawing/2014/main" id="{B8A8440D-59A0-4873-9549-8667236B40BA}"/>
+              </a:ext>
+            </a:extLst>
+          </p:cNvPr>
+          <p:cNvPicPr>
+            <a:picLocks noChangeAspect="1"/>
+          </p:cNvPicPr>
           <p:nvPr/>
-        </p:nvSpPr>
+        </p:nvPicPr>
+        <p:blipFill>
+          <a:blip r:embed="rId2"/>
+          <a:stretch>
+            <a:fillRect/>
+          </a:stretch>
+        </p:blipFill>
         <p:spPr>
           <a:xfrm>
-            <a:off x="634346" y="877032"/>
-            <a:ext cx="6348084" cy="830997"/>
+            <a:off x="0" y="-23564"/>
+            <a:ext cx="12192000" cy="6905128"/>
           </a:xfrm>
           <a:prstGeom prst="rect">
             <a:avLst/>
           </a:prstGeom>
-          <a:noFill/>
         </p:spPr>
-        <p:txBody>
-          <a:bodyPr wrap="none" rtlCol="0">
-            <a:spAutoFit/>
-          </a:bodyPr>
-          <a:lstStyle/>
-          <a:p>
-            <a:r>
-              <a:rPr lang="pt-BR" sz="4800" dirty="0">
-                <a:solidFill>
-                  <a:schemeClr val="bg1"/>
-                </a:solidFill>
-              </a:rPr>
-              <a:t>O que é realidade virtual</a:t>
-            </a:r>
-          </a:p>
-        </p:txBody>
-      </p:sp>
-      <p:sp>
-        <p:nvSpPr>
-          <p:cNvPr id="2" name="CaixaDeTexto 1">
-            <a:extLst>
-              <a:ext uri="{FF2B5EF4-FFF2-40B4-BE49-F238E27FC236}">
-                <a16:creationId xmlns:a16="http://schemas.microsoft.com/office/drawing/2014/main" id="{07588E84-4ED5-498A-A17F-9F329EF1B8DB}"/>
-              </a:ext>
-            </a:extLst>
-          </p:cNvPr>
-          <p:cNvSpPr txBox="1"/>
-          <p:nvPr/>
-        </p:nvSpPr>
-        <p:spPr>
-          <a:xfrm>
-            <a:off x="535194" y="1951672"/>
-            <a:ext cx="6852492" cy="1477328"/>
-          </a:xfrm>
-          <a:prstGeom prst="rect">
-            <a:avLst/>
-          </a:prstGeom>
-          <a:noFill/>
-        </p:spPr>
-        <p:txBody>
-          <a:bodyPr wrap="square" rtlCol="0">
-            <a:spAutoFit/>
-          </a:bodyPr>
-          <a:lstStyle/>
-          <a:p>
-            <a:r>
-              <a:rPr lang="pt-BR" b="1" dirty="0">
-                <a:solidFill>
-                  <a:schemeClr val="bg1"/>
-                </a:solidFill>
-              </a:rPr>
-              <a:t>Realidade Virtual</a:t>
-            </a:r>
-            <a:r>
-              <a:rPr lang="pt-BR" dirty="0">
-                <a:solidFill>
-                  <a:schemeClr val="bg1"/>
-                </a:solidFill>
-              </a:rPr>
-              <a:t> é uma tecnologia cujo mecanismo é aplicado a uma </a:t>
-            </a:r>
-            <a:r>
-              <a:rPr lang="pt-BR" i="1" dirty="0">
-                <a:solidFill>
-                  <a:schemeClr val="bg1"/>
-                </a:solidFill>
-              </a:rPr>
-              <a:t>interface </a:t>
-            </a:r>
-            <a:r>
-              <a:rPr lang="pt-BR" dirty="0">
-                <a:solidFill>
-                  <a:schemeClr val="bg1"/>
-                </a:solidFill>
-              </a:rPr>
-              <a:t>que conecta os usuários e utiliza um sistema informatizado, para construir uma plataforma realista e proporcionar ao visitante uma sensação de que o que se está vendo é praticamente parte do real.</a:t>
-            </a:r>
-          </a:p>
-        </p:txBody>
-      </p:sp>
-      <p:sp>
-        <p:nvSpPr>
-          <p:cNvPr id="3" name="CaixaDeTexto 2">
-            <a:extLst>
-              <a:ext uri="{FF2B5EF4-FFF2-40B4-BE49-F238E27FC236}">
-                <a16:creationId xmlns:a16="http://schemas.microsoft.com/office/drawing/2014/main" id="{87BB89CA-022B-43DD-A952-F8E58B7BEBC2}"/>
-              </a:ext>
-            </a:extLst>
-          </p:cNvPr>
-          <p:cNvSpPr txBox="1"/>
-          <p:nvPr/>
-        </p:nvSpPr>
-        <p:spPr>
-          <a:xfrm>
-            <a:off x="634346" y="4192170"/>
-            <a:ext cx="8582138" cy="1754326"/>
-          </a:xfrm>
-          <a:prstGeom prst="rect">
-            <a:avLst/>
-          </a:prstGeom>
-          <a:noFill/>
-        </p:spPr>
-        <p:txBody>
-          <a:bodyPr wrap="square" rtlCol="0">
-            <a:spAutoFit/>
-          </a:bodyPr>
-          <a:lstStyle/>
-          <a:p>
-            <a:r>
-              <a:rPr lang="pt-BR" b="1" dirty="0">
-                <a:solidFill>
-                  <a:schemeClr val="bg1"/>
-                </a:solidFill>
-              </a:rPr>
-              <a:t>Realidade virtual</a:t>
-            </a:r>
-            <a:r>
-              <a:rPr lang="pt-BR" dirty="0">
-                <a:solidFill>
-                  <a:schemeClr val="bg1"/>
-                </a:solidFill>
-              </a:rPr>
-              <a:t> é uma </a:t>
-            </a:r>
-            <a:r>
-              <a:rPr lang="pt-BR" dirty="0">
-                <a:solidFill>
-                  <a:schemeClr val="bg1"/>
-                </a:solidFill>
-                <a:hlinkClick r:id="rId2" tooltip="Tecnologia">
-                  <a:extLst>
-                    <a:ext uri="{A12FA001-AC4F-418D-AE19-62706E023703}">
-                      <ahyp:hlinkClr xmlns:ahyp="http://schemas.microsoft.com/office/drawing/2018/hyperlinkcolor" val="tx"/>
-                    </a:ext>
-                  </a:extLst>
-                </a:hlinkClick>
-              </a:rPr>
-              <a:t>tecnologia</a:t>
-            </a:r>
-            <a:r>
-              <a:rPr lang="pt-BR" dirty="0">
-                <a:solidFill>
-                  <a:schemeClr val="bg1"/>
-                </a:solidFill>
-              </a:rPr>
-              <a:t> de </a:t>
-            </a:r>
-            <a:r>
-              <a:rPr lang="pt-BR" dirty="0">
-                <a:solidFill>
-                  <a:schemeClr val="bg1"/>
-                </a:solidFill>
-                <a:hlinkClick r:id="rId3">
-                  <a:extLst>
-                    <a:ext uri="{A12FA001-AC4F-418D-AE19-62706E023703}">
-                      <ahyp:hlinkClr xmlns:ahyp="http://schemas.microsoft.com/office/drawing/2018/hyperlinkcolor" val="tx"/>
-                    </a:ext>
-                  </a:extLst>
-                </a:hlinkClick>
-              </a:rPr>
-              <a:t>interface</a:t>
-            </a:r>
-            <a:r>
-              <a:rPr lang="pt-BR" dirty="0">
-                <a:solidFill>
-                  <a:schemeClr val="bg1"/>
-                </a:solidFill>
-              </a:rPr>
-              <a:t> entre um usuário e um </a:t>
-            </a:r>
-            <a:r>
-              <a:rPr lang="pt-BR" dirty="0">
-                <a:solidFill>
-                  <a:schemeClr val="bg1"/>
-                </a:solidFill>
-                <a:hlinkClick r:id="rId4" tooltip="Sistema operacional">
-                  <a:extLst>
-                    <a:ext uri="{A12FA001-AC4F-418D-AE19-62706E023703}">
-                      <ahyp:hlinkClr xmlns:ahyp="http://schemas.microsoft.com/office/drawing/2018/hyperlinkcolor" val="tx"/>
-                    </a:ext>
-                  </a:extLst>
-                </a:hlinkClick>
-              </a:rPr>
-              <a:t>sistema operacional</a:t>
-            </a:r>
-            <a:r>
-              <a:rPr lang="pt-BR" dirty="0">
-                <a:solidFill>
-                  <a:schemeClr val="bg1"/>
-                </a:solidFill>
-              </a:rPr>
-              <a:t> através de recursos gráficos 3D ou imagens 360º cujo objetivo é criar a sensação de presença em um ambiente virtual diferente do real. Para isso, essa interação é realizada em </a:t>
-            </a:r>
-            <a:r>
-              <a:rPr lang="pt-BR" dirty="0">
-                <a:solidFill>
-                  <a:schemeClr val="bg1"/>
-                </a:solidFill>
-                <a:hlinkClick r:id="rId5" tooltip="Tempo real">
-                  <a:extLst>
-                    <a:ext uri="{A12FA001-AC4F-418D-AE19-62706E023703}">
-                      <ahyp:hlinkClr xmlns:ahyp="http://schemas.microsoft.com/office/drawing/2018/hyperlinkcolor" val="tx"/>
-                    </a:ext>
-                  </a:extLst>
-                </a:hlinkClick>
-              </a:rPr>
-              <a:t>tempo real</a:t>
-            </a:r>
-            <a:r>
-              <a:rPr lang="pt-BR" dirty="0">
-                <a:solidFill>
-                  <a:schemeClr val="bg1"/>
-                </a:solidFill>
-              </a:rPr>
-              <a:t>, com o uso de técnicas e de equipamentos computacionais que ajudem na ampliação do sentimento de presença do usuário no ambiente virtual. Esta sensação de presença é usualmente referida como imersão.</a:t>
-            </a:r>
-          </a:p>
-        </p:txBody>
-      </p:sp>
+      </p:pic>
     </p:spTree>
     <p:extLst>
       <p:ext uri="{BB962C8B-B14F-4D97-AF65-F5344CB8AC3E}">
-        <p14:creationId xmlns:p14="http://schemas.microsoft.com/office/powerpoint/2010/main" val="853888252"/>
+        <p14:creationId xmlns:p14="http://schemas.microsoft.com/office/powerpoint/2010/main" val="3787878174"/>
       </p:ext>
     </p:extLst>
   </p:cSld>
@@ -3799,10 +3445,160 @@
           <a:chExt cx="0" cy="0"/>
         </a:xfrm>
       </p:grpSpPr>
+      <p:pic>
+        <p:nvPicPr>
+          <p:cNvPr id="4" name="Imagem 3">
+            <a:extLst>
+              <a:ext uri="{FF2B5EF4-FFF2-40B4-BE49-F238E27FC236}">
+                <a16:creationId xmlns:a16="http://schemas.microsoft.com/office/drawing/2014/main" id="{6515FF5A-961B-40F7-B564-4FA8E75DEB2D}"/>
+              </a:ext>
+            </a:extLst>
+          </p:cNvPr>
+          <p:cNvPicPr>
+            <a:picLocks noChangeAspect="1"/>
+          </p:cNvPicPr>
+          <p:nvPr/>
+        </p:nvPicPr>
+        <p:blipFill>
+          <a:blip r:embed="rId2"/>
+          <a:stretch>
+            <a:fillRect/>
+          </a:stretch>
+        </p:blipFill>
+        <p:spPr>
+          <a:xfrm>
+            <a:off x="0" y="-23564"/>
+            <a:ext cx="12192000" cy="6905128"/>
+          </a:xfrm>
+          <a:prstGeom prst="rect">
+            <a:avLst/>
+          </a:prstGeom>
+        </p:spPr>
+      </p:pic>
     </p:spTree>
     <p:extLst>
       <p:ext uri="{BB962C8B-B14F-4D97-AF65-F5344CB8AC3E}">
-        <p14:creationId xmlns:p14="http://schemas.microsoft.com/office/powerpoint/2010/main" val="3135199488"/>
+        <p14:creationId xmlns:p14="http://schemas.microsoft.com/office/powerpoint/2010/main" val="4217644905"/>
+      </p:ext>
+    </p:extLst>
+  </p:cSld>
+  <p:clrMapOvr>
+    <a:masterClrMapping/>
+  </p:clrMapOvr>
+</p:sld>
+</file>
+
+<file path=ppt/slides/slide4.xml><?xml version="1.0" encoding="utf-8"?>
+<p:sld xmlns:a="http://schemas.openxmlformats.org/drawingml/2006/main" xmlns:r="http://schemas.openxmlformats.org/officeDocument/2006/relationships" xmlns:p="http://schemas.openxmlformats.org/presentationml/2006/main">
+  <p:cSld>
+    <p:spTree>
+      <p:nvGrpSpPr>
+        <p:cNvPr id="1" name=""/>
+        <p:cNvGrpSpPr/>
+        <p:nvPr/>
+      </p:nvGrpSpPr>
+      <p:grpSpPr>
+        <a:xfrm>
+          <a:off x="0" y="0"/>
+          <a:ext cx="0" cy="0"/>
+          <a:chOff x="0" y="0"/>
+          <a:chExt cx="0" cy="0"/>
+        </a:xfrm>
+      </p:grpSpPr>
+      <p:pic>
+        <p:nvPicPr>
+          <p:cNvPr id="5" name="Imagem 4">
+            <a:extLst>
+              <a:ext uri="{FF2B5EF4-FFF2-40B4-BE49-F238E27FC236}">
+                <a16:creationId xmlns:a16="http://schemas.microsoft.com/office/drawing/2014/main" id="{2A4E5AAE-89AF-4A8F-BF58-6C882E373170}"/>
+              </a:ext>
+            </a:extLst>
+          </p:cNvPr>
+          <p:cNvPicPr>
+            <a:picLocks noChangeAspect="1"/>
+          </p:cNvPicPr>
+          <p:nvPr/>
+        </p:nvPicPr>
+        <p:blipFill>
+          <a:blip r:embed="rId2"/>
+          <a:stretch>
+            <a:fillRect/>
+          </a:stretch>
+        </p:blipFill>
+        <p:spPr>
+          <a:xfrm>
+            <a:off x="0" y="-19328"/>
+            <a:ext cx="12192000" cy="6896656"/>
+          </a:xfrm>
+          <a:prstGeom prst="rect">
+            <a:avLst/>
+          </a:prstGeom>
+        </p:spPr>
+      </p:pic>
+    </p:spTree>
+    <p:extLst>
+      <p:ext uri="{BB962C8B-B14F-4D97-AF65-F5344CB8AC3E}">
+        <p14:creationId xmlns:p14="http://schemas.microsoft.com/office/powerpoint/2010/main" val="1298443473"/>
+      </p:ext>
+    </p:extLst>
+  </p:cSld>
+  <p:clrMapOvr>
+    <a:masterClrMapping/>
+  </p:clrMapOvr>
+</p:sld>
+</file>
+
+<file path=ppt/slides/slide5.xml><?xml version="1.0" encoding="utf-8"?>
+<p:sld xmlns:a="http://schemas.openxmlformats.org/drawingml/2006/main" xmlns:r="http://schemas.openxmlformats.org/officeDocument/2006/relationships" xmlns:p="http://schemas.openxmlformats.org/presentationml/2006/main">
+  <p:cSld>
+    <p:spTree>
+      <p:nvGrpSpPr>
+        <p:cNvPr id="1" name=""/>
+        <p:cNvGrpSpPr/>
+        <p:nvPr/>
+      </p:nvGrpSpPr>
+      <p:grpSpPr>
+        <a:xfrm>
+          <a:off x="0" y="0"/>
+          <a:ext cx="0" cy="0"/>
+          <a:chOff x="0" y="0"/>
+          <a:chExt cx="0" cy="0"/>
+        </a:xfrm>
+      </p:grpSpPr>
+      <p:pic>
+        <p:nvPicPr>
+          <p:cNvPr id="4" name="Imagem 3">
+            <a:extLst>
+              <a:ext uri="{FF2B5EF4-FFF2-40B4-BE49-F238E27FC236}">
+                <a16:creationId xmlns:a16="http://schemas.microsoft.com/office/drawing/2014/main" id="{3F81914E-8A9D-4746-A104-B2828C7B0A4A}"/>
+              </a:ext>
+            </a:extLst>
+          </p:cNvPr>
+          <p:cNvPicPr>
+            <a:picLocks noChangeAspect="1"/>
+          </p:cNvPicPr>
+          <p:nvPr/>
+        </p:nvPicPr>
+        <p:blipFill>
+          <a:blip r:embed="rId2"/>
+          <a:stretch>
+            <a:fillRect/>
+          </a:stretch>
+        </p:blipFill>
+        <p:spPr>
+          <a:xfrm>
+            <a:off x="0" y="-19328"/>
+            <a:ext cx="12192000" cy="6896656"/>
+          </a:xfrm>
+          <a:prstGeom prst="rect">
+            <a:avLst/>
+          </a:prstGeom>
+        </p:spPr>
+      </p:pic>
+    </p:spTree>
+    <p:extLst>
+      <p:ext uri="{BB962C8B-B14F-4D97-AF65-F5344CB8AC3E}">
+        <p14:creationId xmlns:p14="http://schemas.microsoft.com/office/powerpoint/2010/main" val="3898996854"/>
       </p:ext>
     </p:extLst>
   </p:cSld>

</xml_diff>